<commit_message>
final presentation part ii
</commit_message>
<xml_diff>
--- a/documents/final_presentation/Final Presentation.pptx
+++ b/documents/final_presentation/Final Presentation.pptx
@@ -16,10 +16,10 @@
     <p:sldId id="275" r:id="rId10"/>
     <p:sldId id="262" r:id="rId11"/>
     <p:sldId id="263" r:id="rId12"/>
-    <p:sldId id="266" r:id="rId13"/>
-    <p:sldId id="264" r:id="rId14"/>
-    <p:sldId id="265" r:id="rId15"/>
-    <p:sldId id="272" r:id="rId16"/>
+    <p:sldId id="264" r:id="rId13"/>
+    <p:sldId id="265" r:id="rId14"/>
+    <p:sldId id="272" r:id="rId15"/>
+    <p:sldId id="266" r:id="rId16"/>
     <p:sldId id="269" r:id="rId17"/>
     <p:sldId id="267" r:id="rId18"/>
     <p:sldId id="271" r:id="rId19"/>
@@ -6857,7 +6857,9 @@
           <a:p>
             <a:pPr lvl="1"/>
             <a:r>
-              <a:rPr lang="de-DE" sz="1200" dirty="0"/>
+              <a:rPr lang="de-DE" sz="1200" dirty="0">
+                <a:hlinkClick r:id="rId2"/>
+              </a:rPr>
               <a:t>https://github.com/tinf15b4-kino/kino-web</a:t>
             </a:r>
             <a:endParaRPr lang="de-DE" sz="1200" dirty="0"/>
@@ -6873,7 +6875,7 @@
           <p:nvPr/>
         </p:nvPicPr>
         <p:blipFill>
-          <a:blip r:embed="rId2"/>
+          <a:blip r:embed="rId3"/>
           <a:stretch>
             <a:fillRect/>
           </a:stretch>
@@ -7035,14 +7037,28 @@
           <a:p>
             <a:r>
               <a:rPr lang="de-DE" dirty="0"/>
-              <a:t>Frameworks</a:t>
-            </a:r>
+              <a:t>Software-Architektur</a:t>
+            </a:r>
+            <a:br>
+              <a:rPr lang="de-DE" dirty="0"/>
+            </a:br>
+            <a:r>
+              <a:rPr lang="de-DE" sz="2800" dirty="0">
+                <a:sym typeface="Wingdings 3" panose="05040102010807070707" pitchFamily="18" charset="2"/>
+              </a:rPr>
+              <a:t> </a:t>
+            </a:r>
+            <a:r>
+              <a:rPr lang="de-DE" sz="2800" dirty="0"/>
+              <a:t>MVC</a:t>
+            </a:r>
+            <a:endParaRPr lang="de-DE" dirty="0"/>
           </a:p>
         </p:txBody>
       </p:sp>
       <p:pic>
         <p:nvPicPr>
-          <p:cNvPr id="4" name="Inhaltsplatzhalter 3"/>
+          <p:cNvPr id="6" name="Inhaltsplatzhalter 5"/>
           <p:cNvPicPr>
             <a:picLocks noGrp="1" noChangeAspect="1"/>
           </p:cNvPicPr>
@@ -7050,47 +7066,22 @@
             <p:ph idx="1"/>
           </p:nvPr>
         </p:nvPicPr>
-        <p:blipFill>
+        <p:blipFill rotWithShape="1">
           <a:blip r:embed="rId2"/>
-          <a:stretch>
-            <a:fillRect/>
-          </a:stretch>
+          <a:srcRect t="13495"/>
+          <a:stretch/>
         </p:blipFill>
         <p:spPr>
           <a:xfrm>
-            <a:off x="2589047" y="2038717"/>
-            <a:ext cx="2381582" cy="1419423"/>
-          </a:xfrm>
-        </p:spPr>
-      </p:pic>
-      <p:pic>
-        <p:nvPicPr>
-          <p:cNvPr id="5" name="Grafik 4"/>
-          <p:cNvPicPr>
-            <a:picLocks noChangeAspect="1"/>
-          </p:cNvPicPr>
-          <p:nvPr/>
-        </p:nvPicPr>
-        <p:blipFill>
-          <a:blip r:embed="rId3"/>
-          <a:stretch>
-            <a:fillRect/>
-          </a:stretch>
-        </p:blipFill>
-        <p:spPr>
-          <a:xfrm>
-            <a:off x="2319762" y="4033387"/>
-            <a:ext cx="2920151" cy="706809"/>
-          </a:xfrm>
-          <a:prstGeom prst="rect">
-            <a:avLst/>
-          </a:prstGeom>
+            <a:off x="960438" y="2133600"/>
+            <a:ext cx="5638800" cy="3188718"/>
+          </a:xfrm>
         </p:spPr>
       </p:pic>
     </p:spTree>
     <p:extLst>
       <p:ext uri="{BB962C8B-B14F-4D97-AF65-F5344CB8AC3E}">
-        <p14:creationId xmlns:p14="http://schemas.microsoft.com/office/powerpoint/2010/main" val="3504115697"/>
+        <p14:creationId xmlns:p14="http://schemas.microsoft.com/office/powerpoint/2010/main" val="3099180631"/>
       </p:ext>
     </p:extLst>
   </p:cSld>
@@ -7149,13 +7140,12 @@
               <a:rPr lang="de-DE" sz="2800" dirty="0"/>
               <a:t>MVC</a:t>
             </a:r>
-            <a:endParaRPr lang="de-DE" dirty="0"/>
           </a:p>
         </p:txBody>
       </p:sp>
       <p:pic>
         <p:nvPicPr>
-          <p:cNvPr id="6" name="Inhaltsplatzhalter 5"/>
+          <p:cNvPr id="4" name="Inhaltsplatzhalter 3"/>
           <p:cNvPicPr>
             <a:picLocks noGrp="1" noChangeAspect="1"/>
           </p:cNvPicPr>
@@ -7163,22 +7153,23 @@
             <p:ph idx="1"/>
           </p:nvPr>
         </p:nvPicPr>
-        <p:blipFill rotWithShape="1">
+        <p:blipFill>
           <a:blip r:embed="rId2"/>
-          <a:srcRect t="13495"/>
-          <a:stretch/>
+          <a:stretch>
+            <a:fillRect/>
+          </a:stretch>
         </p:blipFill>
         <p:spPr>
           <a:xfrm>
-            <a:off x="960438" y="2133600"/>
-            <a:ext cx="5638800" cy="3188718"/>
+            <a:off x="609600" y="2151407"/>
+            <a:ext cx="6348413" cy="3744526"/>
           </a:xfrm>
         </p:spPr>
       </p:pic>
     </p:spTree>
     <p:extLst>
       <p:ext uri="{BB962C8B-B14F-4D97-AF65-F5344CB8AC3E}">
-        <p14:creationId xmlns:p14="http://schemas.microsoft.com/office/powerpoint/2010/main" val="3099180631"/>
+        <p14:creationId xmlns:p14="http://schemas.microsoft.com/office/powerpoint/2010/main" val="69571075"/>
       </p:ext>
     </p:extLst>
   </p:cSld>
@@ -7235,9 +7226,8 @@
             </a:r>
             <a:r>
               <a:rPr lang="de-DE" sz="2800" dirty="0"/>
-              <a:t>MVC</a:t>
-            </a:r>
-            <a:endParaRPr lang="de-DE" sz="2800" dirty="0"/>
+              <a:t>Patterns</a:t>
+            </a:r>
           </a:p>
         </p:txBody>
       </p:sp>
@@ -7258,15 +7248,55 @@
           <a:p>
             <a:r>
               <a:rPr lang="de-DE" dirty="0"/>
-              <a:t>TODO Class Diagramm</a:t>
-            </a:r>
-          </a:p>
-        </p:txBody>
-      </p:sp>
+              <a:t>Template </a:t>
+            </a:r>
+            <a:r>
+              <a:rPr lang="de-DE" dirty="0" err="1"/>
+              <a:t>method</a:t>
+            </a:r>
+            <a:r>
+              <a:rPr lang="de-DE" dirty="0"/>
+              <a:t> </a:t>
+            </a:r>
+            <a:r>
+              <a:rPr lang="de-DE" dirty="0" err="1"/>
+              <a:t>pattern</a:t>
+            </a:r>
+            <a:r>
+              <a:rPr lang="de-DE" dirty="0"/>
+              <a:t> (Schablonenmethode)</a:t>
+            </a:r>
+          </a:p>
+        </p:txBody>
+      </p:sp>
+      <p:pic>
+        <p:nvPicPr>
+          <p:cNvPr id="4" name="Grafik 3"/>
+          <p:cNvPicPr>
+            <a:picLocks noChangeAspect="1"/>
+          </p:cNvPicPr>
+          <p:nvPr/>
+        </p:nvPicPr>
+        <p:blipFill>
+          <a:blip r:embed="rId2"/>
+          <a:stretch>
+            <a:fillRect/>
+          </a:stretch>
+        </p:blipFill>
+        <p:spPr>
+          <a:xfrm>
+            <a:off x="1262323" y="2740041"/>
+            <a:ext cx="5042264" cy="2531045"/>
+          </a:xfrm>
+          <a:prstGeom prst="rect">
+            <a:avLst/>
+          </a:prstGeom>
+        </p:spPr>
+      </p:pic>
     </p:spTree>
     <p:extLst>
       <p:ext uri="{BB962C8B-B14F-4D97-AF65-F5344CB8AC3E}">
-        <p14:creationId xmlns:p14="http://schemas.microsoft.com/office/powerpoint/2010/main" val="69571075"/>
+        <p14:creationId xmlns:p14="http://schemas.microsoft.com/office/powerpoint/2010/main" val="2408726183"/>
       </p:ext>
     </p:extLst>
   </p:cSld>
@@ -7310,70 +7340,20 @@
           <a:p>
             <a:r>
               <a:rPr lang="de-DE" dirty="0"/>
-              <a:t>Software-Architektur</a:t>
-            </a:r>
-            <a:br>
-              <a:rPr lang="de-DE" dirty="0"/>
-            </a:br>
-            <a:r>
-              <a:rPr lang="de-DE" sz="2800" dirty="0">
-                <a:sym typeface="Wingdings 3" panose="05040102010807070707" pitchFamily="18" charset="2"/>
-              </a:rPr>
-              <a:t> </a:t>
-            </a:r>
-            <a:r>
-              <a:rPr lang="de-DE" sz="2800" dirty="0"/>
-              <a:t>Patterns</a:t>
-            </a:r>
-            <a:endParaRPr lang="de-DE" sz="2800" dirty="0"/>
-          </a:p>
-        </p:txBody>
-      </p:sp>
-      <p:sp>
-        <p:nvSpPr>
-          <p:cNvPr id="3" name="Inhaltsplatzhalter 2"/>
-          <p:cNvSpPr>
-            <a:spLocks noGrp="1"/>
-          </p:cNvSpPr>
-          <p:nvPr>
-            <p:ph idx="1"/>
-          </p:nvPr>
-        </p:nvSpPr>
-        <p:spPr/>
-        <p:txBody>
-          <a:bodyPr/>
-          <a:lstStyle/>
-          <a:p>
-            <a:r>
-              <a:rPr lang="de-DE" dirty="0"/>
-              <a:t>Template </a:t>
-            </a:r>
-            <a:r>
-              <a:rPr lang="de-DE" dirty="0" err="1"/>
-              <a:t>method</a:t>
-            </a:r>
-            <a:r>
-              <a:rPr lang="de-DE" dirty="0"/>
-              <a:t> </a:t>
-            </a:r>
-            <a:r>
-              <a:rPr lang="de-DE" dirty="0" err="1"/>
-              <a:t>pattern</a:t>
-            </a:r>
-            <a:r>
-              <a:rPr lang="de-DE" dirty="0"/>
-              <a:t> (Schablonenmethode)</a:t>
+              <a:t>Frameworks</a:t>
             </a:r>
           </a:p>
         </p:txBody>
       </p:sp>
       <p:pic>
         <p:nvPicPr>
-          <p:cNvPr id="4" name="Grafik 3"/>
+          <p:cNvPr id="4" name="Inhaltsplatzhalter 3"/>
           <p:cNvPicPr>
-            <a:picLocks noChangeAspect="1"/>
+            <a:picLocks noGrp="1" noChangeAspect="1"/>
           </p:cNvPicPr>
-          <p:nvPr/>
+          <p:nvPr>
+            <p:ph idx="1"/>
+          </p:nvPr>
         </p:nvPicPr>
         <p:blipFill>
           <a:blip r:embed="rId2"/>
@@ -7383,8 +7363,29 @@
         </p:blipFill>
         <p:spPr>
           <a:xfrm>
-            <a:off x="1262323" y="2740041"/>
-            <a:ext cx="5042264" cy="2531045"/>
+            <a:off x="2589047" y="2038717"/>
+            <a:ext cx="2381582" cy="1419423"/>
+          </a:xfrm>
+        </p:spPr>
+      </p:pic>
+      <p:pic>
+        <p:nvPicPr>
+          <p:cNvPr id="5" name="Grafik 4"/>
+          <p:cNvPicPr>
+            <a:picLocks noChangeAspect="1"/>
+          </p:cNvPicPr>
+          <p:nvPr/>
+        </p:nvPicPr>
+        <p:blipFill>
+          <a:blip r:embed="rId3"/>
+          <a:stretch>
+            <a:fillRect/>
+          </a:stretch>
+        </p:blipFill>
+        <p:spPr>
+          <a:xfrm>
+            <a:off x="2319762" y="4033387"/>
+            <a:ext cx="2920151" cy="706809"/>
           </a:xfrm>
           <a:prstGeom prst="rect">
             <a:avLst/>
@@ -7394,7 +7395,7 @@
     </p:spTree>
     <p:extLst>
       <p:ext uri="{BB962C8B-B14F-4D97-AF65-F5344CB8AC3E}">
-        <p14:creationId xmlns:p14="http://schemas.microsoft.com/office/powerpoint/2010/main" val="2408726183"/>
+        <p14:creationId xmlns:p14="http://schemas.microsoft.com/office/powerpoint/2010/main" val="3504115697"/>
       </p:ext>
     </p:extLst>
   </p:cSld>
@@ -7438,29 +7439,13 @@
           <a:p>
             <a:r>
               <a:rPr lang="de-DE" dirty="0" err="1"/>
-              <a:t>Continous</a:t>
+              <a:t>Deployment</a:t>
             </a:r>
             <a:r>
               <a:rPr lang="de-DE" dirty="0"/>
-              <a:t> Integration</a:t>
-            </a:r>
-            <a:br>
-              <a:rPr lang="de-DE" dirty="0"/>
-            </a:br>
-            <a:r>
-              <a:rPr lang="de-DE" sz="2800" dirty="0">
-                <a:sym typeface="Wingdings 3" panose="05040102010807070707" pitchFamily="18" charset="2"/>
-              </a:rPr>
-              <a:t> </a:t>
-            </a:r>
-            <a:r>
-              <a:rPr lang="de-DE" sz="2800" dirty="0" err="1"/>
-              <a:t>Deployment</a:t>
-            </a:r>
-            <a:r>
-              <a:rPr lang="de-DE" sz="2800" dirty="0"/>
               <a:t> View</a:t>
             </a:r>
+            <a:endParaRPr lang="de-DE" sz="2800" dirty="0"/>
           </a:p>
         </p:txBody>
       </p:sp>
@@ -7599,7 +7584,6 @@
               <a:rPr lang="de-DE" sz="1400" dirty="0"/>
               <a:t>TODO Jenkins Screenshot</a:t>
             </a:r>
-            <a:endParaRPr lang="de-DE" sz="1400" dirty="0"/>
           </a:p>
         </p:txBody>
       </p:sp>
@@ -7868,7 +7852,6 @@
               <a:rPr lang="de-DE" sz="1200" dirty="0"/>
               <a:t>https://sonarcloud.io/dashboard?id=de.tinf15b4.kino%3AHEAD</a:t>
             </a:r>
-            <a:endParaRPr lang="de-DE" sz="1200" dirty="0"/>
           </a:p>
         </p:txBody>
       </p:sp>
@@ -7973,7 +7956,6 @@
               <a:rPr lang="de-DE" dirty="0"/>
               <a:t>Verfügbar als Android App und Web-Anwendung!</a:t>
             </a:r>
-            <a:endParaRPr lang="de-DE" dirty="0"/>
           </a:p>
         </p:txBody>
       </p:sp>
@@ -8045,7 +8027,9 @@
           <a:lstStyle/>
           <a:p>
             <a:r>
-              <a:rPr lang="de-DE" dirty="0"/>
+              <a:rPr lang="de-DE" dirty="0">
+                <a:hlinkClick r:id="rId2"/>
+              </a:rPr>
               <a:t>https://smartcinema.tinf15b4.de/</a:t>
             </a:r>
             <a:endParaRPr lang="de-DE" dirty="0"/>
@@ -8623,7 +8607,6 @@
               <a:rPr lang="de-DE" dirty="0"/>
               <a:t>Kostenschätzung</a:t>
             </a:r>
-            <a:endParaRPr lang="de-DE" dirty="0"/>
           </a:p>
         </p:txBody>
       </p:sp>
@@ -8765,7 +8748,6 @@
               <a:rPr lang="de-DE" dirty="0"/>
               <a:t>Kostenschätzung</a:t>
             </a:r>
-            <a:endParaRPr lang="de-DE" dirty="0"/>
           </a:p>
         </p:txBody>
       </p:sp>

</xml_diff>

<commit_message>
final presentation part iii - hopefully done now
</commit_message>
<xml_diff>
--- a/documents/final_presentation/Final Presentation.pptx
+++ b/documents/final_presentation/Final Presentation.pptx
@@ -7580,10 +7580,10 @@
             <a:endParaRPr lang="de-DE" sz="1200" dirty="0"/>
           </a:p>
           <a:p>
-            <a:r>
-              <a:rPr lang="de-DE" sz="1400" dirty="0"/>
-              <a:t>TODO Jenkins Screenshot</a:t>
-            </a:r>
+            <a:pPr marL="0" indent="0">
+              <a:buNone/>
+            </a:pPr>
+            <a:endParaRPr lang="de-DE" sz="1400" dirty="0"/>
           </a:p>
         </p:txBody>
       </p:sp>
@@ -7605,6 +7605,30 @@
           <a:xfrm>
             <a:off x="5168906" y="2116348"/>
             <a:ext cx="606414" cy="833819"/>
+          </a:xfrm>
+          <a:prstGeom prst="rect">
+            <a:avLst/>
+          </a:prstGeom>
+        </p:spPr>
+      </p:pic>
+      <p:pic>
+        <p:nvPicPr>
+          <p:cNvPr id="5" name="Grafik 4"/>
+          <p:cNvPicPr>
+            <a:picLocks noChangeAspect="1"/>
+          </p:cNvPicPr>
+          <p:nvPr/>
+        </p:nvPicPr>
+        <p:blipFill>
+          <a:blip r:embed="rId4"/>
+          <a:stretch>
+            <a:fillRect/>
+          </a:stretch>
+        </p:blipFill>
+        <p:spPr>
+          <a:xfrm>
+            <a:off x="609599" y="3247918"/>
+            <a:ext cx="6347713" cy="1567630"/>
           </a:xfrm>
           <a:prstGeom prst="rect">
             <a:avLst/>
@@ -7717,7 +7741,7 @@
           <a:p>
             <a:r>
               <a:rPr lang="de-DE" dirty="0" err="1"/>
-              <a:t>Fuctional</a:t>
+              <a:t>Functional</a:t>
             </a:r>
             <a:r>
               <a:rPr lang="de-DE" dirty="0"/>
@@ -7813,13 +7837,7 @@
               <a:rPr lang="de-DE" sz="2800" dirty="0">
                 <a:sym typeface="Wingdings 3" panose="05040102010807070707" pitchFamily="18" charset="2"/>
               </a:rPr>
-              <a:t> </a:t>
-            </a:r>
-            <a:r>
-              <a:rPr lang="de-DE" sz="2800" dirty="0" err="1">
-                <a:sym typeface="Wingdings 3" panose="05040102010807070707" pitchFamily="18" charset="2"/>
-              </a:rPr>
-              <a:t>Metrics</a:t>
+              <a:t> Metriken</a:t>
             </a:r>
             <a:endParaRPr lang="de-DE" dirty="0"/>
           </a:p>

</xml_diff>